<commit_message>
add umi and hooks
</commit_message>
<xml_diff>
--- a/materials/slides/ch02-React基础语法.pptx
+++ b/materials/slides/ch02-React基础语法.pptx
@@ -8138,19 +8138,20 @@
           <a:p>
             <a:pPr marL="593090" lvl="2"/>
             <a:r>
-              <a:rPr lang="zh-CN" altLang="en-US" dirty="0"/>
-              <a:t>初始化</a:t>
+              <a:rPr lang="zh-CN" altLang="en-US" smtClean="0"/>
+              <a:t> 初始化</a:t>
             </a:r>
             <a:r>
               <a:rPr lang="en-US" altLang="zh-CN" dirty="0" smtClean="0"/>
               <a:t> </a:t>
             </a:r>
+            <a:endParaRPr lang="en-US" altLang="zh-CN" dirty="0" smtClean="0"/>
           </a:p>
           <a:p>
             <a:pPr marL="593090" lvl="2"/>
             <a:r>
               <a:rPr lang="zh-CN" altLang="en-US" dirty="0" smtClean="0"/>
-              <a:t>挂载</a:t>
+              <a:t> 挂载</a:t>
             </a:r>
             <a:endParaRPr lang="en-US" altLang="zh-CN" dirty="0" smtClean="0"/>
           </a:p>
@@ -15553,21 +15554,18 @@
               <a:t>React.createElement</a:t>
             </a:r>
             <a:r>
-              <a:rPr lang="en-US" altLang="zh-CN" dirty="0"/>
-              <a:t>( type [, props</a:t>
+              <a:rPr lang="en-US" altLang="zh-CN" smtClean="0"/>
+              <a:t>(  type</a:t>
             </a:r>
             <a:r>
               <a:rPr lang="en-US" altLang="zh-CN" dirty="0" smtClean="0"/>
-              <a:t>] [, ...</a:t>
-            </a:r>
-            <a:r>
-              <a:rPr lang="en-US" altLang="zh-CN" dirty="0"/>
-              <a:t>children] </a:t>
-            </a:r>
-            <a:r>
-              <a:rPr lang="en-US" altLang="zh-CN" dirty="0" smtClean="0"/>
-              <a:t>)</a:t>
-            </a:r>
+              <a:t>, props, ...</a:t>
+            </a:r>
+            <a:r>
+              <a:rPr lang="en-US" altLang="zh-CN" smtClean="0"/>
+              <a:t>children  )</a:t>
+            </a:r>
+            <a:endParaRPr lang="en-US" altLang="zh-CN" dirty="0" smtClean="0"/>
           </a:p>
           <a:p>
             <a:pPr marL="593090" lvl="2"/>

</xml_diff>